<commit_message>
finished introduction minus typos
</commit_message>
<xml_diff>
--- a/figures/fasr_diagram.pptx
+++ b/figures/fasr_diagram.pptx
@@ -5,7 +5,7 @@
     <p:sldMasterId id="2147483648" r:id="rId1"/>
   </p:sldMasterIdLst>
   <p:sldIdLst>
-    <p:sldId id="257" r:id="rId2"/>
+    <p:sldId id="258" r:id="rId2"/>
   </p:sldIdLst>
   <p:sldSz cx="9144000" cy="6858000" type="screen4x3"/>
   <p:notesSz cx="6858000" cy="9144000"/>
@@ -288,7 +288,7 @@
           <a:p>
             <a:fld id="{F7BB3C6E-E62E-1A47-8B96-6F273A5E52B4}" type="datetimeFigureOut">
               <a:rPr lang="en-US" smtClean="0"/>
-              <a:t>5/6/15</a:t>
+              <a:t>11/21/15</a:t>
             </a:fld>
             <a:endParaRPr lang="en-US"/>
           </a:p>
@@ -458,7 +458,7 @@
           <a:p>
             <a:fld id="{F7BB3C6E-E62E-1A47-8B96-6F273A5E52B4}" type="datetimeFigureOut">
               <a:rPr lang="en-US" smtClean="0"/>
-              <a:t>5/6/15</a:t>
+              <a:t>11/21/15</a:t>
             </a:fld>
             <a:endParaRPr lang="en-US"/>
           </a:p>
@@ -638,7 +638,7 @@
           <a:p>
             <a:fld id="{F7BB3C6E-E62E-1A47-8B96-6F273A5E52B4}" type="datetimeFigureOut">
               <a:rPr lang="en-US" smtClean="0"/>
-              <a:t>5/6/15</a:t>
+              <a:t>11/21/15</a:t>
             </a:fld>
             <a:endParaRPr lang="en-US"/>
           </a:p>
@@ -808,7 +808,7 @@
           <a:p>
             <a:fld id="{F7BB3C6E-E62E-1A47-8B96-6F273A5E52B4}" type="datetimeFigureOut">
               <a:rPr lang="en-US" smtClean="0"/>
-              <a:t>5/6/15</a:t>
+              <a:t>11/21/15</a:t>
             </a:fld>
             <a:endParaRPr lang="en-US"/>
           </a:p>
@@ -1054,7 +1054,7 @@
           <a:p>
             <a:fld id="{F7BB3C6E-E62E-1A47-8B96-6F273A5E52B4}" type="datetimeFigureOut">
               <a:rPr lang="en-US" smtClean="0"/>
-              <a:t>5/6/15</a:t>
+              <a:t>11/21/15</a:t>
             </a:fld>
             <a:endParaRPr lang="en-US"/>
           </a:p>
@@ -1342,7 +1342,7 @@
           <a:p>
             <a:fld id="{F7BB3C6E-E62E-1A47-8B96-6F273A5E52B4}" type="datetimeFigureOut">
               <a:rPr lang="en-US" smtClean="0"/>
-              <a:t>5/6/15</a:t>
+              <a:t>11/21/15</a:t>
             </a:fld>
             <a:endParaRPr lang="en-US"/>
           </a:p>
@@ -1764,7 +1764,7 @@
           <a:p>
             <a:fld id="{F7BB3C6E-E62E-1A47-8B96-6F273A5E52B4}" type="datetimeFigureOut">
               <a:rPr lang="en-US" smtClean="0"/>
-              <a:t>5/6/15</a:t>
+              <a:t>11/21/15</a:t>
             </a:fld>
             <a:endParaRPr lang="en-US"/>
           </a:p>
@@ -1882,7 +1882,7 @@
           <a:p>
             <a:fld id="{F7BB3C6E-E62E-1A47-8B96-6F273A5E52B4}" type="datetimeFigureOut">
               <a:rPr lang="en-US" smtClean="0"/>
-              <a:t>5/6/15</a:t>
+              <a:t>11/21/15</a:t>
             </a:fld>
             <a:endParaRPr lang="en-US"/>
           </a:p>
@@ -1977,7 +1977,7 @@
           <a:p>
             <a:fld id="{F7BB3C6E-E62E-1A47-8B96-6F273A5E52B4}" type="datetimeFigureOut">
               <a:rPr lang="en-US" smtClean="0"/>
-              <a:t>5/6/15</a:t>
+              <a:t>11/21/15</a:t>
             </a:fld>
             <a:endParaRPr lang="en-US"/>
           </a:p>
@@ -2254,7 +2254,7 @@
           <a:p>
             <a:fld id="{F7BB3C6E-E62E-1A47-8B96-6F273A5E52B4}" type="datetimeFigureOut">
               <a:rPr lang="en-US" smtClean="0"/>
-              <a:t>5/6/15</a:t>
+              <a:t>11/21/15</a:t>
             </a:fld>
             <a:endParaRPr lang="en-US"/>
           </a:p>
@@ -2507,7 +2507,7 @@
           <a:p>
             <a:fld id="{F7BB3C6E-E62E-1A47-8B96-6F273A5E52B4}" type="datetimeFigureOut">
               <a:rPr lang="en-US" smtClean="0"/>
-              <a:t>5/6/15</a:t>
+              <a:t>11/21/15</a:t>
             </a:fld>
             <a:endParaRPr lang="en-US"/>
           </a:p>
@@ -2720,7 +2720,7 @@
           <a:p>
             <a:fld id="{F7BB3C6E-E62E-1A47-8B96-6F273A5E52B4}" type="datetimeFigureOut">
               <a:rPr lang="en-US" smtClean="0"/>
-              <a:t>5/6/15</a:t>
+              <a:t>11/21/15</a:t>
             </a:fld>
             <a:endParaRPr lang="en-US"/>
           </a:p>
@@ -3147,10 +3147,10 @@
         </p:nvGrpSpPr>
         <p:grpSpPr>
           <a:xfrm>
-            <a:off x="4456706" y="1671053"/>
-            <a:ext cx="1269303" cy="2482771"/>
-            <a:chOff x="4456706" y="1671053"/>
-            <a:chExt cx="1269303" cy="2482771"/>
+            <a:off x="3944589" y="1671053"/>
+            <a:ext cx="1721169" cy="2482771"/>
+            <a:chOff x="3944589" y="1671053"/>
+            <a:chExt cx="1721169" cy="2482771"/>
           </a:xfrm>
         </p:grpSpPr>
         <p:cxnSp>
@@ -3171,7 +3171,7 @@
               <a:avLst/>
             </a:prstGeom>
             <a:ln>
-              <a:prstDash val="dash"/>
+              <a:prstDash val="solid"/>
               <a:tailEnd type="triangle" w="lg"/>
             </a:ln>
           </p:spPr>
@@ -3198,8 +3198,8 @@
           </p:nvSpPr>
           <p:spPr>
             <a:xfrm>
-              <a:off x="4456706" y="2917548"/>
-              <a:ext cx="1269303" cy="830997"/>
+              <a:off x="3944589" y="2909573"/>
+              <a:ext cx="1721169" cy="461665"/>
             </a:xfrm>
             <a:prstGeom prst="rect">
               <a:avLst/>
@@ -3214,17 +3214,18 @@
             <a:p>
               <a:pPr algn="ctr"/>
               <a:r>
-                <a:rPr lang="en-US" sz="1600" dirty="0" smtClean="0"/>
-                <a:t>Annotation</a:t>
+                <a:rPr lang="en-US" sz="2400" b="1" dirty="0" smtClean="0">
+                  <a:solidFill>
+                    <a:srgbClr val="FF0000"/>
+                  </a:solidFill>
+                </a:rPr>
+                <a:t>Correctness</a:t>
               </a:r>
-            </a:p>
-            <a:p>
-              <a:pPr algn="ctr"/>
-              <a:r>
-                <a:rPr lang="en-US" sz="1600" dirty="0" smtClean="0"/>
-                <a:t>Accuracy Verification</a:t>
-              </a:r>
-              <a:endParaRPr lang="en-US" sz="1600" dirty="0"/>
+              <a:endParaRPr lang="en-US" sz="2400" b="1" dirty="0">
+                <a:solidFill>
+                  <a:srgbClr val="FF0000"/>
+                </a:solidFill>
+              </a:endParaRPr>
             </a:p>
           </p:txBody>
         </p:sp>
@@ -3439,8 +3440,8 @@
           </p:nvSpPr>
           <p:spPr>
             <a:xfrm>
-              <a:off x="3341878" y="149958"/>
-              <a:ext cx="1114828" cy="338554"/>
+              <a:off x="3078042" y="149958"/>
+              <a:ext cx="1817194" cy="461665"/>
             </a:xfrm>
             <a:prstGeom prst="rect">
               <a:avLst/>
@@ -3454,10 +3455,18 @@
             <a:lstStyle/>
             <a:p>
               <a:r>
-                <a:rPr lang="en-US" sz="1600" dirty="0" smtClean="0"/>
-                <a:t>Feedback</a:t>
+                <a:rPr lang="en-US" sz="2400" b="1" smtClean="0">
+                  <a:solidFill>
+                    <a:srgbClr val="FF0000"/>
+                  </a:solidFill>
+                </a:rPr>
+                <a:t>Consistency</a:t>
               </a:r>
-              <a:endParaRPr lang="en-US" sz="1600" dirty="0" smtClean="0"/>
+              <a:endParaRPr lang="en-US" sz="2400" b="1" dirty="0" smtClean="0">
+                <a:solidFill>
+                  <a:srgbClr val="FF0000"/>
+                </a:solidFill>
+              </a:endParaRPr>
             </a:p>
           </p:txBody>
         </p:sp>
@@ -3470,10 +3479,10 @@
         </p:nvGrpSpPr>
         <p:grpSpPr>
           <a:xfrm>
-            <a:off x="6011013" y="1284488"/>
-            <a:ext cx="3132987" cy="3274243"/>
-            <a:chOff x="6011013" y="1284488"/>
-            <a:chExt cx="3132987" cy="3274243"/>
+            <a:off x="6366613" y="1284488"/>
+            <a:ext cx="2777387" cy="3274243"/>
+            <a:chOff x="6366613" y="1284488"/>
+            <a:chExt cx="2777387" cy="3274243"/>
           </a:xfrm>
         </p:grpSpPr>
         <p:sp>
@@ -3626,8 +3635,8 @@
           </p:nvSpPr>
           <p:spPr>
             <a:xfrm>
-              <a:off x="6011013" y="2137351"/>
-              <a:ext cx="1269303" cy="830997"/>
+              <a:off x="6895538" y="3192047"/>
+              <a:ext cx="2248462" cy="461665"/>
             </a:xfrm>
             <a:prstGeom prst="rect">
               <a:avLst/>
@@ -3642,8 +3651,12 @@
             <a:p>
               <a:pPr algn="ctr"/>
               <a:r>
-                <a:rPr lang="en-US" sz="1600" dirty="0" smtClean="0"/>
-                <a:t>Measure Diagnostic Confidence</a:t>
+                <a:rPr lang="en-US" sz="2400" b="1" dirty="0" smtClean="0">
+                  <a:solidFill>
+                    <a:srgbClr val="FF0000"/>
+                  </a:solidFill>
+                </a:rPr>
+                <a:t>Completeness</a:t>
               </a:r>
             </a:p>
           </p:txBody>
@@ -3895,7 +3908,6 @@
                 <a:rPr lang="en-US" sz="1600" dirty="0" smtClean="0"/>
                 <a:t>Interpretation</a:t>
               </a:r>
-              <a:endParaRPr lang="en-US" sz="1600" dirty="0" smtClean="0"/>
             </a:p>
           </p:txBody>
         </p:sp>
@@ -4266,7 +4278,7 @@
     </p:spTree>
     <p:extLst>
       <p:ext uri="{BB962C8B-B14F-4D97-AF65-F5344CB8AC3E}">
-        <p14:creationId xmlns:p14="http://schemas.microsoft.com/office/powerpoint/2010/main" val="3628601195"/>
+        <p14:creationId xmlns:p14="http://schemas.microsoft.com/office/powerpoint/2010/main" val="4289346373"/>
       </p:ext>
     </p:extLst>
   </p:cSld>

</xml_diff>